<commit_message>
Added icons for 3D model tab bar item
</commit_message>
<xml_diff>
--- a/AppIcon.pptx
+++ b/AppIcon.pptx
@@ -6,6 +6,7 @@
   </p:sldMasterIdLst>
   <p:sldIdLst>
     <p:sldId id="256" r:id="rId2"/>
+    <p:sldId id="257" r:id="rId3"/>
   </p:sldIdLst>
   <p:sldSz cx="12192000" cy="6858000"/>
   <p:notesSz cx="6858000" cy="9144000"/>
@@ -104,6 +105,11 @@
       </a:defRPr>
     </a:lvl9pPr>
   </p:defaultTextStyle>
+  <p:extLst>
+    <p:ext uri="{EFAFB233-063F-42B5-8137-9DF3F51BA10A}">
+      <p15:sldGuideLst xmlns:p15="http://schemas.microsoft.com/office/powerpoint/2012/main"/>
+    </p:ext>
+  </p:extLst>
 </p:presentation>
 </file>
 
@@ -238,7 +244,7 @@
           <a:p>
             <a:fld id="{C727F7F2-7894-C348-B4D5-A172BE5D5EDF}" type="datetimeFigureOut">
               <a:rPr lang="en-US" smtClean="0"/>
-              <a:t>9/2/17</a:t>
+              <a:t>9/25/17</a:t>
             </a:fld>
             <a:endParaRPr lang="en-US"/>
           </a:p>
@@ -408,7 +414,7 @@
           <a:p>
             <a:fld id="{C727F7F2-7894-C348-B4D5-A172BE5D5EDF}" type="datetimeFigureOut">
               <a:rPr lang="en-US" smtClean="0"/>
-              <a:t>9/2/17</a:t>
+              <a:t>9/25/17</a:t>
             </a:fld>
             <a:endParaRPr lang="en-US"/>
           </a:p>
@@ -588,7 +594,7 @@
           <a:p>
             <a:fld id="{C727F7F2-7894-C348-B4D5-A172BE5D5EDF}" type="datetimeFigureOut">
               <a:rPr lang="en-US" smtClean="0"/>
-              <a:t>9/2/17</a:t>
+              <a:t>9/25/17</a:t>
             </a:fld>
             <a:endParaRPr lang="en-US"/>
           </a:p>
@@ -758,7 +764,7 @@
           <a:p>
             <a:fld id="{C727F7F2-7894-C348-B4D5-A172BE5D5EDF}" type="datetimeFigureOut">
               <a:rPr lang="en-US" smtClean="0"/>
-              <a:t>9/2/17</a:t>
+              <a:t>9/25/17</a:t>
             </a:fld>
             <a:endParaRPr lang="en-US"/>
           </a:p>
@@ -1004,7 +1010,7 @@
           <a:p>
             <a:fld id="{C727F7F2-7894-C348-B4D5-A172BE5D5EDF}" type="datetimeFigureOut">
               <a:rPr lang="en-US" smtClean="0"/>
-              <a:t>9/2/17</a:t>
+              <a:t>9/25/17</a:t>
             </a:fld>
             <a:endParaRPr lang="en-US"/>
           </a:p>
@@ -1236,7 +1242,7 @@
           <a:p>
             <a:fld id="{C727F7F2-7894-C348-B4D5-A172BE5D5EDF}" type="datetimeFigureOut">
               <a:rPr lang="en-US" smtClean="0"/>
-              <a:t>9/2/17</a:t>
+              <a:t>9/25/17</a:t>
             </a:fld>
             <a:endParaRPr lang="en-US"/>
           </a:p>
@@ -1603,7 +1609,7 @@
           <a:p>
             <a:fld id="{C727F7F2-7894-C348-B4D5-A172BE5D5EDF}" type="datetimeFigureOut">
               <a:rPr lang="en-US" smtClean="0"/>
-              <a:t>9/2/17</a:t>
+              <a:t>9/25/17</a:t>
             </a:fld>
             <a:endParaRPr lang="en-US"/>
           </a:p>
@@ -1721,7 +1727,7 @@
           <a:p>
             <a:fld id="{C727F7F2-7894-C348-B4D5-A172BE5D5EDF}" type="datetimeFigureOut">
               <a:rPr lang="en-US" smtClean="0"/>
-              <a:t>9/2/17</a:t>
+              <a:t>9/25/17</a:t>
             </a:fld>
             <a:endParaRPr lang="en-US"/>
           </a:p>
@@ -1816,7 +1822,7 @@
           <a:p>
             <a:fld id="{C727F7F2-7894-C348-B4D5-A172BE5D5EDF}" type="datetimeFigureOut">
               <a:rPr lang="en-US" smtClean="0"/>
-              <a:t>9/2/17</a:t>
+              <a:t>9/25/17</a:t>
             </a:fld>
             <a:endParaRPr lang="en-US"/>
           </a:p>
@@ -2093,7 +2099,7 @@
           <a:p>
             <a:fld id="{C727F7F2-7894-C348-B4D5-A172BE5D5EDF}" type="datetimeFigureOut">
               <a:rPr lang="en-US" smtClean="0"/>
-              <a:t>9/2/17</a:t>
+              <a:t>9/25/17</a:t>
             </a:fld>
             <a:endParaRPr lang="en-US"/>
           </a:p>
@@ -2346,7 +2352,7 @@
           <a:p>
             <a:fld id="{C727F7F2-7894-C348-B4D5-A172BE5D5EDF}" type="datetimeFigureOut">
               <a:rPr lang="en-US" smtClean="0"/>
-              <a:t>9/2/17</a:t>
+              <a:t>9/25/17</a:t>
             </a:fld>
             <a:endParaRPr lang="en-US"/>
           </a:p>
@@ -2559,7 +2565,7 @@
           <a:p>
             <a:fld id="{C727F7F2-7894-C348-B4D5-A172BE5D5EDF}" type="datetimeFigureOut">
               <a:rPr lang="en-US" smtClean="0"/>
-              <a:t>9/2/17</a:t>
+              <a:t>9/25/17</a:t>
             </a:fld>
             <a:endParaRPr lang="en-US"/>
           </a:p>
@@ -3400,6 +3406,351 @@
 </p:sld>
 </file>
 
+<file path=ppt/slides/slide2.xml><?xml version="1.0" encoding="utf-8"?>
+<p:sld xmlns:a="http://schemas.openxmlformats.org/drawingml/2006/main" xmlns:r="http://schemas.openxmlformats.org/officeDocument/2006/relationships" xmlns:p="http://schemas.openxmlformats.org/presentationml/2006/main">
+  <p:cSld>
+    <p:spTree>
+      <p:nvGrpSpPr>
+        <p:cNvPr id="1" name=""/>
+        <p:cNvGrpSpPr/>
+        <p:nvPr/>
+      </p:nvGrpSpPr>
+      <p:grpSpPr>
+        <a:xfrm>
+          <a:off x="0" y="0"/>
+          <a:ext cx="0" cy="0"/>
+          <a:chOff x="0" y="0"/>
+          <a:chExt cx="0" cy="0"/>
+        </a:xfrm>
+      </p:grpSpPr>
+      <p:grpSp>
+        <p:nvGrpSpPr>
+          <p:cNvPr id="10" name="Group 9"/>
+          <p:cNvGrpSpPr/>
+          <p:nvPr/>
+        </p:nvGrpSpPr>
+        <p:grpSpPr>
+          <a:xfrm>
+            <a:off x="2082798" y="889000"/>
+            <a:ext cx="5400000" cy="5400000"/>
+            <a:chOff x="2082800" y="889000"/>
+            <a:chExt cx="1800000" cy="1800000"/>
+          </a:xfrm>
+        </p:grpSpPr>
+        <p:sp>
+          <p:nvSpPr>
+            <p:cNvPr id="4" name="Rounded Rectangle 3"/>
+            <p:cNvSpPr/>
+            <p:nvPr/>
+          </p:nvSpPr>
+          <p:spPr>
+            <a:xfrm>
+              <a:off x="2082800" y="889000"/>
+              <a:ext cx="1800000" cy="1800000"/>
+            </a:xfrm>
+            <a:prstGeom prst="roundRect">
+              <a:avLst/>
+            </a:prstGeom>
+            <a:solidFill>
+              <a:schemeClr val="tx1"/>
+            </a:solidFill>
+            <a:ln>
+              <a:noFill/>
+            </a:ln>
+          </p:spPr>
+          <p:style>
+            <a:lnRef idx="2">
+              <a:schemeClr val="accent1">
+                <a:shade val="50000"/>
+              </a:schemeClr>
+            </a:lnRef>
+            <a:fillRef idx="1">
+              <a:schemeClr val="accent1"/>
+            </a:fillRef>
+            <a:effectRef idx="0">
+              <a:schemeClr val="accent1"/>
+            </a:effectRef>
+            <a:fontRef idx="minor">
+              <a:schemeClr val="lt1"/>
+            </a:fontRef>
+          </p:style>
+          <p:txBody>
+            <a:bodyPr rtlCol="0" anchor="ctr"/>
+            <a:lstStyle/>
+            <a:p>
+              <a:pPr algn="ctr"/>
+              <a:endParaRPr lang="en-US"/>
+            </a:p>
+          </p:txBody>
+        </p:sp>
+        <p:sp>
+          <p:nvSpPr>
+            <p:cNvPr id="7" name="Freeform 6"/>
+            <p:cNvSpPr/>
+            <p:nvPr/>
+          </p:nvSpPr>
+          <p:spPr>
+            <a:xfrm>
+              <a:off x="2297467" y="1305674"/>
+              <a:ext cx="1370666" cy="966651"/>
+            </a:xfrm>
+            <a:custGeom>
+              <a:avLst/>
+              <a:gdLst>
+                <a:gd name="connsiteX0" fmla="*/ 3007879 w 4703418"/>
+                <a:gd name="connsiteY0" fmla="*/ 0 h 3161212"/>
+                <a:gd name="connsiteX1" fmla="*/ 2781457 w 4703418"/>
+                <a:gd name="connsiteY1" fmla="*/ 809897 h 3161212"/>
+                <a:gd name="connsiteX2" fmla="*/ 2163148 w 4703418"/>
+                <a:gd name="connsiteY2" fmla="*/ 1402080 h 3161212"/>
+                <a:gd name="connsiteX3" fmla="*/ 1274874 w 4703418"/>
+                <a:gd name="connsiteY3" fmla="*/ 2142309 h 3161212"/>
+                <a:gd name="connsiteX4" fmla="*/ 473685 w 4703418"/>
+                <a:gd name="connsiteY4" fmla="*/ 2290354 h 3161212"/>
+                <a:gd name="connsiteX5" fmla="*/ 64382 w 4703418"/>
+                <a:gd name="connsiteY5" fmla="*/ 2447109 h 3161212"/>
+                <a:gd name="connsiteX6" fmla="*/ 20839 w 4703418"/>
+                <a:gd name="connsiteY6" fmla="*/ 2786743 h 3161212"/>
+                <a:gd name="connsiteX7" fmla="*/ 264679 w 4703418"/>
+                <a:gd name="connsiteY7" fmla="*/ 2987040 h 3161212"/>
+                <a:gd name="connsiteX8" fmla="*/ 482394 w 4703418"/>
+                <a:gd name="connsiteY8" fmla="*/ 2960914 h 3161212"/>
+                <a:gd name="connsiteX9" fmla="*/ 1048451 w 4703418"/>
+                <a:gd name="connsiteY9" fmla="*/ 3161212 h 3161212"/>
+                <a:gd name="connsiteX10" fmla="*/ 1771262 w 4703418"/>
+                <a:gd name="connsiteY10" fmla="*/ 2960914 h 3161212"/>
+                <a:gd name="connsiteX11" fmla="*/ 2668245 w 4703418"/>
+                <a:gd name="connsiteY11" fmla="*/ 2603863 h 3161212"/>
+                <a:gd name="connsiteX12" fmla="*/ 3312679 w 4703418"/>
+                <a:gd name="connsiteY12" fmla="*/ 2551612 h 3161212"/>
+                <a:gd name="connsiteX13" fmla="*/ 3896154 w 4703418"/>
+                <a:gd name="connsiteY13" fmla="*/ 2690949 h 3161212"/>
+                <a:gd name="connsiteX14" fmla="*/ 4331582 w 4703418"/>
+                <a:gd name="connsiteY14" fmla="*/ 2621280 h 3161212"/>
+                <a:gd name="connsiteX15" fmla="*/ 4618965 w 4703418"/>
+                <a:gd name="connsiteY15" fmla="*/ 2360023 h 3161212"/>
+                <a:gd name="connsiteX16" fmla="*/ 4697342 w 4703418"/>
+                <a:gd name="connsiteY16" fmla="*/ 2011680 h 3161212"/>
+                <a:gd name="connsiteX17" fmla="*/ 4488337 w 4703418"/>
+                <a:gd name="connsiteY17" fmla="*/ 1132114 h 3161212"/>
+                <a:gd name="connsiteX18" fmla="*/ 4497045 w 4703418"/>
+                <a:gd name="connsiteY18" fmla="*/ 583474 h 3161212"/>
+                <a:gd name="connsiteX19" fmla="*/ 4601548 w 4703418"/>
+                <a:gd name="connsiteY19" fmla="*/ 26126 h 3161212"/>
+              </a:gdLst>
+              <a:ahLst/>
+              <a:cxnLst>
+                <a:cxn ang="0">
+                  <a:pos x="connsiteX0" y="connsiteY0"/>
+                </a:cxn>
+                <a:cxn ang="0">
+                  <a:pos x="connsiteX1" y="connsiteY1"/>
+                </a:cxn>
+                <a:cxn ang="0">
+                  <a:pos x="connsiteX2" y="connsiteY2"/>
+                </a:cxn>
+                <a:cxn ang="0">
+                  <a:pos x="connsiteX3" y="connsiteY3"/>
+                </a:cxn>
+                <a:cxn ang="0">
+                  <a:pos x="connsiteX4" y="connsiteY4"/>
+                </a:cxn>
+                <a:cxn ang="0">
+                  <a:pos x="connsiteX5" y="connsiteY5"/>
+                </a:cxn>
+                <a:cxn ang="0">
+                  <a:pos x="connsiteX6" y="connsiteY6"/>
+                </a:cxn>
+                <a:cxn ang="0">
+                  <a:pos x="connsiteX7" y="connsiteY7"/>
+                </a:cxn>
+                <a:cxn ang="0">
+                  <a:pos x="connsiteX8" y="connsiteY8"/>
+                </a:cxn>
+                <a:cxn ang="0">
+                  <a:pos x="connsiteX9" y="connsiteY9"/>
+                </a:cxn>
+                <a:cxn ang="0">
+                  <a:pos x="connsiteX10" y="connsiteY10"/>
+                </a:cxn>
+                <a:cxn ang="0">
+                  <a:pos x="connsiteX11" y="connsiteY11"/>
+                </a:cxn>
+                <a:cxn ang="0">
+                  <a:pos x="connsiteX12" y="connsiteY12"/>
+                </a:cxn>
+                <a:cxn ang="0">
+                  <a:pos x="connsiteX13" y="connsiteY13"/>
+                </a:cxn>
+                <a:cxn ang="0">
+                  <a:pos x="connsiteX14" y="connsiteY14"/>
+                </a:cxn>
+                <a:cxn ang="0">
+                  <a:pos x="connsiteX15" y="connsiteY15"/>
+                </a:cxn>
+                <a:cxn ang="0">
+                  <a:pos x="connsiteX16" y="connsiteY16"/>
+                </a:cxn>
+                <a:cxn ang="0">
+                  <a:pos x="connsiteX17" y="connsiteY17"/>
+                </a:cxn>
+                <a:cxn ang="0">
+                  <a:pos x="connsiteX18" y="connsiteY18"/>
+                </a:cxn>
+                <a:cxn ang="0">
+                  <a:pos x="connsiteX19" y="connsiteY19"/>
+                </a:cxn>
+              </a:cxnLst>
+              <a:rect l="l" t="t" r="r" b="b"/>
+              <a:pathLst>
+                <a:path w="4703418" h="3161212">
+                  <a:moveTo>
+                    <a:pt x="3007879" y="0"/>
+                  </a:moveTo>
+                  <a:cubicBezTo>
+                    <a:pt x="2965062" y="288108"/>
+                    <a:pt x="2922245" y="576217"/>
+                    <a:pt x="2781457" y="809897"/>
+                  </a:cubicBezTo>
+                  <a:cubicBezTo>
+                    <a:pt x="2640668" y="1043577"/>
+                    <a:pt x="2414245" y="1180011"/>
+                    <a:pt x="2163148" y="1402080"/>
+                  </a:cubicBezTo>
+                  <a:cubicBezTo>
+                    <a:pt x="1912051" y="1624149"/>
+                    <a:pt x="1556451" y="1994263"/>
+                    <a:pt x="1274874" y="2142309"/>
+                  </a:cubicBezTo>
+                  <a:cubicBezTo>
+                    <a:pt x="993297" y="2290355"/>
+                    <a:pt x="675434" y="2239554"/>
+                    <a:pt x="473685" y="2290354"/>
+                  </a:cubicBezTo>
+                  <a:cubicBezTo>
+                    <a:pt x="271936" y="2341154"/>
+                    <a:pt x="139856" y="2364378"/>
+                    <a:pt x="64382" y="2447109"/>
+                  </a:cubicBezTo>
+                  <a:cubicBezTo>
+                    <a:pt x="-11092" y="2529840"/>
+                    <a:pt x="-12544" y="2696754"/>
+                    <a:pt x="20839" y="2786743"/>
+                  </a:cubicBezTo>
+                  <a:cubicBezTo>
+                    <a:pt x="54222" y="2876732"/>
+                    <a:pt x="187753" y="2958012"/>
+                    <a:pt x="264679" y="2987040"/>
+                  </a:cubicBezTo>
+                  <a:cubicBezTo>
+                    <a:pt x="341605" y="3016069"/>
+                    <a:pt x="351765" y="2931885"/>
+                    <a:pt x="482394" y="2960914"/>
+                  </a:cubicBezTo>
+                  <a:cubicBezTo>
+                    <a:pt x="613023" y="2989943"/>
+                    <a:pt x="833640" y="3161212"/>
+                    <a:pt x="1048451" y="3161212"/>
+                  </a:cubicBezTo>
+                  <a:cubicBezTo>
+                    <a:pt x="1263262" y="3161212"/>
+                    <a:pt x="1501296" y="3053805"/>
+                    <a:pt x="1771262" y="2960914"/>
+                  </a:cubicBezTo>
+                  <a:cubicBezTo>
+                    <a:pt x="2041228" y="2868023"/>
+                    <a:pt x="2411342" y="2672080"/>
+                    <a:pt x="2668245" y="2603863"/>
+                  </a:cubicBezTo>
+                  <a:cubicBezTo>
+                    <a:pt x="2925148" y="2535646"/>
+                    <a:pt x="3108028" y="2537098"/>
+                    <a:pt x="3312679" y="2551612"/>
+                  </a:cubicBezTo>
+                  <a:cubicBezTo>
+                    <a:pt x="3517331" y="2566126"/>
+                    <a:pt x="3726337" y="2679338"/>
+                    <a:pt x="3896154" y="2690949"/>
+                  </a:cubicBezTo>
+                  <a:cubicBezTo>
+                    <a:pt x="4065971" y="2702560"/>
+                    <a:pt x="4211114" y="2676434"/>
+                    <a:pt x="4331582" y="2621280"/>
+                  </a:cubicBezTo>
+                  <a:cubicBezTo>
+                    <a:pt x="4452051" y="2566126"/>
+                    <a:pt x="4558005" y="2461623"/>
+                    <a:pt x="4618965" y="2360023"/>
+                  </a:cubicBezTo>
+                  <a:cubicBezTo>
+                    <a:pt x="4679925" y="2258423"/>
+                    <a:pt x="4719113" y="2216331"/>
+                    <a:pt x="4697342" y="2011680"/>
+                  </a:cubicBezTo>
+                  <a:cubicBezTo>
+                    <a:pt x="4675571" y="1807029"/>
+                    <a:pt x="4521720" y="1370148"/>
+                    <a:pt x="4488337" y="1132114"/>
+                  </a:cubicBezTo>
+                  <a:cubicBezTo>
+                    <a:pt x="4454954" y="894080"/>
+                    <a:pt x="4478177" y="767805"/>
+                    <a:pt x="4497045" y="583474"/>
+                  </a:cubicBezTo>
+                  <a:cubicBezTo>
+                    <a:pt x="4515914" y="399143"/>
+                    <a:pt x="4601548" y="26126"/>
+                    <a:pt x="4601548" y="26126"/>
+                  </a:cubicBezTo>
+                </a:path>
+              </a:pathLst>
+            </a:custGeom>
+            <a:solidFill>
+              <a:schemeClr val="bg1"/>
+            </a:solidFill>
+            <a:ln>
+              <a:noFill/>
+            </a:ln>
+          </p:spPr>
+          <p:style>
+            <a:lnRef idx="2">
+              <a:schemeClr val="accent1">
+                <a:shade val="50000"/>
+              </a:schemeClr>
+            </a:lnRef>
+            <a:fillRef idx="1">
+              <a:schemeClr val="accent1"/>
+            </a:fillRef>
+            <a:effectRef idx="0">
+              <a:schemeClr val="accent1"/>
+            </a:effectRef>
+            <a:fontRef idx="minor">
+              <a:schemeClr val="lt1"/>
+            </a:fontRef>
+          </p:style>
+          <p:txBody>
+            <a:bodyPr rtlCol="0" anchor="ctr"/>
+            <a:lstStyle/>
+            <a:p>
+              <a:pPr algn="ctr"/>
+              <a:endParaRPr lang="en-US"/>
+            </a:p>
+          </p:txBody>
+        </p:sp>
+      </p:grpSp>
+    </p:spTree>
+    <p:extLst>
+      <p:ext uri="{BB962C8B-B14F-4D97-AF65-F5344CB8AC3E}">
+        <p14:creationId xmlns:p14="http://schemas.microsoft.com/office/powerpoint/2010/main" val="8894304"/>
+      </p:ext>
+    </p:extLst>
+  </p:cSld>
+  <p:clrMapOvr>
+    <a:masterClrMapping/>
+  </p:clrMapOvr>
+</p:sld>
+</file>
+
 <file path=ppt/theme/theme1.xml><?xml version="1.0" encoding="utf-8"?>
 <a:theme xmlns:a="http://schemas.openxmlformats.org/drawingml/2006/main" name="Office Theme">
   <a:themeElements>

</xml_diff>

<commit_message>
Added custom icons to both tab bar pages
</commit_message>
<xml_diff>
--- a/AppIcon.pptx
+++ b/AppIcon.pptx
@@ -7,6 +7,7 @@
   <p:sldIdLst>
     <p:sldId id="256" r:id="rId2"/>
     <p:sldId id="257" r:id="rId3"/>
+    <p:sldId id="258" r:id="rId4"/>
   </p:sldIdLst>
   <p:sldSz cx="12192000" cy="6858000"/>
   <p:notesSz cx="6858000" cy="9144000"/>
@@ -3425,7 +3426,7 @@
       </p:grpSpPr>
       <p:grpSp>
         <p:nvGrpSpPr>
-          <p:cNvPr id="10" name="Group 9"/>
+          <p:cNvPr id="2" name="Group 1"/>
           <p:cNvGrpSpPr/>
           <p:nvPr/>
         </p:nvGrpSpPr>
@@ -3433,8 +3434,8 @@
           <a:xfrm>
             <a:off x="2082798" y="889000"/>
             <a:ext cx="5400000" cy="5400000"/>
-            <a:chOff x="2082800" y="889000"/>
-            <a:chExt cx="1800000" cy="1800000"/>
+            <a:chOff x="2082798" y="889000"/>
+            <a:chExt cx="5400000" cy="5400000"/>
           </a:xfrm>
         </p:grpSpPr>
         <p:sp>
@@ -3445,15 +3446,13 @@
           </p:nvSpPr>
           <p:spPr>
             <a:xfrm>
-              <a:off x="2082800" y="889000"/>
-              <a:ext cx="1800000" cy="1800000"/>
+              <a:off x="2082798" y="889000"/>
+              <a:ext cx="5400000" cy="5400000"/>
             </a:xfrm>
             <a:prstGeom prst="roundRect">
               <a:avLst/>
             </a:prstGeom>
-            <a:solidFill>
-              <a:schemeClr val="tx1"/>
-            </a:solidFill>
+            <a:noFill/>
             <a:ln>
               <a:noFill/>
             </a:ln>
@@ -3491,8 +3490,8 @@
           </p:nvSpPr>
           <p:spPr>
             <a:xfrm>
-              <a:off x="2297467" y="1305674"/>
-              <a:ext cx="1370666" cy="966651"/>
+              <a:off x="2726799" y="2139022"/>
+              <a:ext cx="4111998" cy="2899953"/>
             </a:xfrm>
             <a:custGeom>
               <a:avLst/>
@@ -3706,7 +3705,7 @@
               </a:pathLst>
             </a:custGeom>
             <a:solidFill>
-              <a:schemeClr val="bg1"/>
+              <a:schemeClr val="tx1"/>
             </a:solidFill>
             <a:ln>
               <a:noFill/>
@@ -3742,6 +3741,444 @@
     <p:extLst>
       <p:ext uri="{BB962C8B-B14F-4D97-AF65-F5344CB8AC3E}">
         <p14:creationId xmlns:p14="http://schemas.microsoft.com/office/powerpoint/2010/main" val="8894304"/>
+      </p:ext>
+    </p:extLst>
+  </p:cSld>
+  <p:clrMapOvr>
+    <a:masterClrMapping/>
+  </p:clrMapOvr>
+</p:sld>
+</file>
+
+<file path=ppt/slides/slide3.xml><?xml version="1.0" encoding="utf-8"?>
+<p:sld xmlns:a="http://schemas.openxmlformats.org/drawingml/2006/main" xmlns:r="http://schemas.openxmlformats.org/officeDocument/2006/relationships" xmlns:p="http://schemas.openxmlformats.org/presentationml/2006/main">
+  <p:cSld>
+    <p:spTree>
+      <p:nvGrpSpPr>
+        <p:cNvPr id="1" name=""/>
+        <p:cNvGrpSpPr/>
+        <p:nvPr/>
+      </p:nvGrpSpPr>
+      <p:grpSpPr>
+        <a:xfrm>
+          <a:off x="0" y="0"/>
+          <a:ext cx="0" cy="0"/>
+          <a:chOff x="0" y="0"/>
+          <a:chExt cx="0" cy="0"/>
+        </a:xfrm>
+      </p:grpSpPr>
+      <p:grpSp>
+        <p:nvGrpSpPr>
+          <p:cNvPr id="15" name="Group 14"/>
+          <p:cNvGrpSpPr/>
+          <p:nvPr/>
+        </p:nvGrpSpPr>
+        <p:grpSpPr>
+          <a:xfrm>
+            <a:off x="3347884" y="1179872"/>
+            <a:ext cx="3240000" cy="3240000"/>
+            <a:chOff x="3347884" y="1179872"/>
+            <a:chExt cx="3240000" cy="3240000"/>
+          </a:xfrm>
+        </p:grpSpPr>
+        <p:grpSp>
+          <p:nvGrpSpPr>
+            <p:cNvPr id="6" name="Group 5"/>
+            <p:cNvGrpSpPr/>
+            <p:nvPr/>
+          </p:nvGrpSpPr>
+          <p:grpSpPr>
+            <a:xfrm>
+              <a:off x="3891252" y="1356852"/>
+              <a:ext cx="2153265" cy="2880000"/>
+              <a:chOff x="4011561" y="1356852"/>
+              <a:chExt cx="2880000" cy="2880000"/>
+            </a:xfrm>
+          </p:grpSpPr>
+          <p:sp>
+            <p:nvSpPr>
+              <p:cNvPr id="3" name="Rounded Rectangle 2"/>
+              <p:cNvSpPr/>
+              <p:nvPr/>
+            </p:nvSpPr>
+            <p:spPr>
+              <a:xfrm>
+                <a:off x="4011561" y="1356852"/>
+                <a:ext cx="2880000" cy="2880000"/>
+              </a:xfrm>
+              <a:prstGeom prst="roundRect">
+                <a:avLst/>
+              </a:prstGeom>
+              <a:noFill/>
+              <a:ln w="28575">
+                <a:solidFill>
+                  <a:schemeClr val="tx1"/>
+                </a:solidFill>
+              </a:ln>
+            </p:spPr>
+            <p:style>
+              <a:lnRef idx="2">
+                <a:schemeClr val="accent1">
+                  <a:shade val="50000"/>
+                </a:schemeClr>
+              </a:lnRef>
+              <a:fillRef idx="1">
+                <a:schemeClr val="accent1"/>
+              </a:fillRef>
+              <a:effectRef idx="0">
+                <a:schemeClr val="accent1"/>
+              </a:effectRef>
+              <a:fontRef idx="minor">
+                <a:schemeClr val="lt1"/>
+              </a:fontRef>
+            </p:style>
+            <p:txBody>
+              <a:bodyPr rtlCol="0" anchor="ctr"/>
+              <a:lstStyle/>
+              <a:p>
+                <a:pPr algn="ctr"/>
+                <a:endParaRPr lang="en-US"/>
+              </a:p>
+            </p:txBody>
+          </p:sp>
+          <p:sp>
+            <p:nvSpPr>
+              <p:cNvPr id="5" name="Rectangle 4"/>
+              <p:cNvSpPr/>
+              <p:nvPr/>
+            </p:nvSpPr>
+            <p:spPr>
+              <a:xfrm>
+                <a:off x="4191561" y="2753691"/>
+                <a:ext cx="2520000" cy="180000"/>
+              </a:xfrm>
+              <a:prstGeom prst="rect">
+                <a:avLst/>
+              </a:prstGeom>
+              <a:solidFill>
+                <a:schemeClr val="tx1"/>
+              </a:solidFill>
+              <a:ln>
+                <a:solidFill>
+                  <a:schemeClr val="tx1"/>
+                </a:solidFill>
+              </a:ln>
+            </p:spPr>
+            <p:style>
+              <a:lnRef idx="2">
+                <a:schemeClr val="accent1">
+                  <a:shade val="50000"/>
+                </a:schemeClr>
+              </a:lnRef>
+              <a:fillRef idx="1">
+                <a:schemeClr val="accent1"/>
+              </a:fillRef>
+              <a:effectRef idx="0">
+                <a:schemeClr val="accent1"/>
+              </a:effectRef>
+              <a:fontRef idx="minor">
+                <a:schemeClr val="lt1"/>
+              </a:fontRef>
+            </p:style>
+            <p:txBody>
+              <a:bodyPr rtlCol="0" anchor="ctr"/>
+              <a:lstStyle/>
+              <a:p>
+                <a:pPr algn="ctr"/>
+                <a:endParaRPr lang="en-US"/>
+              </a:p>
+            </p:txBody>
+          </p:sp>
+          <p:sp>
+            <p:nvSpPr>
+              <p:cNvPr id="8" name="Rectangle 7"/>
+              <p:cNvSpPr/>
+              <p:nvPr/>
+            </p:nvSpPr>
+            <p:spPr>
+              <a:xfrm>
+                <a:off x="4191561" y="2379194"/>
+                <a:ext cx="2520000" cy="180000"/>
+              </a:xfrm>
+              <a:prstGeom prst="rect">
+                <a:avLst/>
+              </a:prstGeom>
+              <a:solidFill>
+                <a:schemeClr val="tx1"/>
+              </a:solidFill>
+              <a:ln>
+                <a:solidFill>
+                  <a:schemeClr val="tx1"/>
+                </a:solidFill>
+              </a:ln>
+            </p:spPr>
+            <p:style>
+              <a:lnRef idx="2">
+                <a:schemeClr val="accent1">
+                  <a:shade val="50000"/>
+                </a:schemeClr>
+              </a:lnRef>
+              <a:fillRef idx="1">
+                <a:schemeClr val="accent1"/>
+              </a:fillRef>
+              <a:effectRef idx="0">
+                <a:schemeClr val="accent1"/>
+              </a:effectRef>
+              <a:fontRef idx="minor">
+                <a:schemeClr val="lt1"/>
+              </a:fontRef>
+            </p:style>
+            <p:txBody>
+              <a:bodyPr rtlCol="0" anchor="ctr"/>
+              <a:lstStyle/>
+              <a:p>
+                <a:pPr algn="ctr"/>
+                <a:endParaRPr lang="en-US"/>
+              </a:p>
+            </p:txBody>
+          </p:sp>
+          <p:sp>
+            <p:nvSpPr>
+              <p:cNvPr id="9" name="Rectangle 8"/>
+              <p:cNvSpPr/>
+              <p:nvPr/>
+            </p:nvSpPr>
+            <p:spPr>
+              <a:xfrm>
+                <a:off x="4191561" y="1630200"/>
+                <a:ext cx="2520000" cy="180000"/>
+              </a:xfrm>
+              <a:prstGeom prst="rect">
+                <a:avLst/>
+              </a:prstGeom>
+              <a:solidFill>
+                <a:schemeClr val="tx1"/>
+              </a:solidFill>
+              <a:ln>
+                <a:solidFill>
+                  <a:schemeClr val="tx1"/>
+                </a:solidFill>
+              </a:ln>
+            </p:spPr>
+            <p:style>
+              <a:lnRef idx="2">
+                <a:schemeClr val="accent1">
+                  <a:shade val="50000"/>
+                </a:schemeClr>
+              </a:lnRef>
+              <a:fillRef idx="1">
+                <a:schemeClr val="accent1"/>
+              </a:fillRef>
+              <a:effectRef idx="0">
+                <a:schemeClr val="accent1"/>
+              </a:effectRef>
+              <a:fontRef idx="minor">
+                <a:schemeClr val="lt1"/>
+              </a:fontRef>
+            </p:style>
+            <p:txBody>
+              <a:bodyPr rtlCol="0" anchor="ctr"/>
+              <a:lstStyle/>
+              <a:p>
+                <a:pPr algn="ctr"/>
+                <a:endParaRPr lang="en-US"/>
+              </a:p>
+            </p:txBody>
+          </p:sp>
+          <p:sp>
+            <p:nvSpPr>
+              <p:cNvPr id="10" name="Rectangle 9"/>
+              <p:cNvSpPr/>
+              <p:nvPr/>
+            </p:nvSpPr>
+            <p:spPr>
+              <a:xfrm>
+                <a:off x="4191561" y="2004697"/>
+                <a:ext cx="2520000" cy="180000"/>
+              </a:xfrm>
+              <a:prstGeom prst="rect">
+                <a:avLst/>
+              </a:prstGeom>
+              <a:solidFill>
+                <a:schemeClr val="tx1"/>
+              </a:solidFill>
+              <a:ln>
+                <a:solidFill>
+                  <a:schemeClr val="tx1"/>
+                </a:solidFill>
+              </a:ln>
+            </p:spPr>
+            <p:style>
+              <a:lnRef idx="2">
+                <a:schemeClr val="accent1">
+                  <a:shade val="50000"/>
+                </a:schemeClr>
+              </a:lnRef>
+              <a:fillRef idx="1">
+                <a:schemeClr val="accent1"/>
+              </a:fillRef>
+              <a:effectRef idx="0">
+                <a:schemeClr val="accent1"/>
+              </a:effectRef>
+              <a:fontRef idx="minor">
+                <a:schemeClr val="lt1"/>
+              </a:fontRef>
+            </p:style>
+            <p:txBody>
+              <a:bodyPr rtlCol="0" anchor="ctr"/>
+              <a:lstStyle/>
+              <a:p>
+                <a:pPr algn="ctr"/>
+                <a:endParaRPr lang="en-US"/>
+              </a:p>
+            </p:txBody>
+          </p:sp>
+          <p:sp>
+            <p:nvSpPr>
+              <p:cNvPr id="11" name="Rectangle 10"/>
+              <p:cNvSpPr/>
+              <p:nvPr/>
+            </p:nvSpPr>
+            <p:spPr>
+              <a:xfrm>
+                <a:off x="4191561" y="3128188"/>
+                <a:ext cx="2520000" cy="180000"/>
+              </a:xfrm>
+              <a:prstGeom prst="rect">
+                <a:avLst/>
+              </a:prstGeom>
+              <a:solidFill>
+                <a:schemeClr val="tx1"/>
+              </a:solidFill>
+              <a:ln>
+                <a:solidFill>
+                  <a:schemeClr val="tx1"/>
+                </a:solidFill>
+              </a:ln>
+            </p:spPr>
+            <p:style>
+              <a:lnRef idx="2">
+                <a:schemeClr val="accent1">
+                  <a:shade val="50000"/>
+                </a:schemeClr>
+              </a:lnRef>
+              <a:fillRef idx="1">
+                <a:schemeClr val="accent1"/>
+              </a:fillRef>
+              <a:effectRef idx="0">
+                <a:schemeClr val="accent1"/>
+              </a:effectRef>
+              <a:fontRef idx="minor">
+                <a:schemeClr val="lt1"/>
+              </a:fontRef>
+            </p:style>
+            <p:txBody>
+              <a:bodyPr rtlCol="0" anchor="ctr"/>
+              <a:lstStyle/>
+              <a:p>
+                <a:pPr algn="ctr"/>
+                <a:endParaRPr lang="en-US"/>
+              </a:p>
+            </p:txBody>
+          </p:sp>
+          <p:sp>
+            <p:nvSpPr>
+              <p:cNvPr id="12" name="Rectangle 11"/>
+              <p:cNvSpPr/>
+              <p:nvPr/>
+            </p:nvSpPr>
+            <p:spPr>
+              <a:xfrm>
+                <a:off x="4191561" y="3502686"/>
+                <a:ext cx="2520000" cy="180000"/>
+              </a:xfrm>
+              <a:prstGeom prst="rect">
+                <a:avLst/>
+              </a:prstGeom>
+              <a:solidFill>
+                <a:schemeClr val="tx1"/>
+              </a:solidFill>
+              <a:ln>
+                <a:solidFill>
+                  <a:schemeClr val="tx1"/>
+                </a:solidFill>
+              </a:ln>
+            </p:spPr>
+            <p:style>
+              <a:lnRef idx="2">
+                <a:schemeClr val="accent1">
+                  <a:shade val="50000"/>
+                </a:schemeClr>
+              </a:lnRef>
+              <a:fillRef idx="1">
+                <a:schemeClr val="accent1"/>
+              </a:fillRef>
+              <a:effectRef idx="0">
+                <a:schemeClr val="accent1"/>
+              </a:effectRef>
+              <a:fontRef idx="minor">
+                <a:schemeClr val="lt1"/>
+              </a:fontRef>
+            </p:style>
+            <p:txBody>
+              <a:bodyPr rtlCol="0" anchor="ctr"/>
+              <a:lstStyle/>
+              <a:p>
+                <a:pPr algn="ctr"/>
+                <a:endParaRPr lang="en-US"/>
+              </a:p>
+            </p:txBody>
+          </p:sp>
+        </p:grpSp>
+        <p:sp>
+          <p:nvSpPr>
+            <p:cNvPr id="13" name="Rectangle 12"/>
+            <p:cNvSpPr/>
+            <p:nvPr/>
+          </p:nvSpPr>
+          <p:spPr>
+            <a:xfrm>
+              <a:off x="3347884" y="1179872"/>
+              <a:ext cx="3240000" cy="3240000"/>
+            </a:xfrm>
+            <a:prstGeom prst="rect">
+              <a:avLst/>
+            </a:prstGeom>
+            <a:noFill/>
+            <a:ln>
+              <a:noFill/>
+            </a:ln>
+          </p:spPr>
+          <p:style>
+            <a:lnRef idx="2">
+              <a:schemeClr val="accent1">
+                <a:shade val="50000"/>
+              </a:schemeClr>
+            </a:lnRef>
+            <a:fillRef idx="1">
+              <a:schemeClr val="accent1"/>
+            </a:fillRef>
+            <a:effectRef idx="0">
+              <a:schemeClr val="accent1"/>
+            </a:effectRef>
+            <a:fontRef idx="minor">
+              <a:schemeClr val="lt1"/>
+            </a:fontRef>
+          </p:style>
+          <p:txBody>
+            <a:bodyPr rtlCol="0" anchor="ctr"/>
+            <a:lstStyle/>
+            <a:p>
+              <a:pPr algn="ctr"/>
+              <a:endParaRPr lang="en-US"/>
+            </a:p>
+          </p:txBody>
+        </p:sp>
+      </p:grpSp>
+    </p:spTree>
+    <p:extLst>
+      <p:ext uri="{BB962C8B-B14F-4D97-AF65-F5344CB8AC3E}">
+        <p14:creationId xmlns:p14="http://schemas.microsoft.com/office/powerpoint/2010/main" val="881802295"/>
       </p:ext>
     </p:extLst>
   </p:cSld>

</xml_diff>

<commit_message>
Added labels to show medical data about leg/foot lengths
</commit_message>
<xml_diff>
--- a/AppIcon.pptx
+++ b/AppIcon.pptx
@@ -8,6 +8,7 @@
     <p:sldId id="256" r:id="rId2"/>
     <p:sldId id="257" r:id="rId3"/>
     <p:sldId id="258" r:id="rId4"/>
+    <p:sldId id="260" r:id="rId5"/>
   </p:sldIdLst>
   <p:sldSz cx="12192000" cy="6858000"/>
   <p:notesSz cx="6858000" cy="9144000"/>
@@ -245,7 +246,7 @@
           <a:p>
             <a:fld id="{C727F7F2-7894-C348-B4D5-A172BE5D5EDF}" type="datetimeFigureOut">
               <a:rPr lang="en-US" smtClean="0"/>
-              <a:t>9/25/17</a:t>
+              <a:t>9/26/17</a:t>
             </a:fld>
             <a:endParaRPr lang="en-US"/>
           </a:p>
@@ -415,7 +416,7 @@
           <a:p>
             <a:fld id="{C727F7F2-7894-C348-B4D5-A172BE5D5EDF}" type="datetimeFigureOut">
               <a:rPr lang="en-US" smtClean="0"/>
-              <a:t>9/25/17</a:t>
+              <a:t>9/26/17</a:t>
             </a:fld>
             <a:endParaRPr lang="en-US"/>
           </a:p>
@@ -595,7 +596,7 @@
           <a:p>
             <a:fld id="{C727F7F2-7894-C348-B4D5-A172BE5D5EDF}" type="datetimeFigureOut">
               <a:rPr lang="en-US" smtClean="0"/>
-              <a:t>9/25/17</a:t>
+              <a:t>9/26/17</a:t>
             </a:fld>
             <a:endParaRPr lang="en-US"/>
           </a:p>
@@ -765,7 +766,7 @@
           <a:p>
             <a:fld id="{C727F7F2-7894-C348-B4D5-A172BE5D5EDF}" type="datetimeFigureOut">
               <a:rPr lang="en-US" smtClean="0"/>
-              <a:t>9/25/17</a:t>
+              <a:t>9/26/17</a:t>
             </a:fld>
             <a:endParaRPr lang="en-US"/>
           </a:p>
@@ -1011,7 +1012,7 @@
           <a:p>
             <a:fld id="{C727F7F2-7894-C348-B4D5-A172BE5D5EDF}" type="datetimeFigureOut">
               <a:rPr lang="en-US" smtClean="0"/>
-              <a:t>9/25/17</a:t>
+              <a:t>9/26/17</a:t>
             </a:fld>
             <a:endParaRPr lang="en-US"/>
           </a:p>
@@ -1243,7 +1244,7 @@
           <a:p>
             <a:fld id="{C727F7F2-7894-C348-B4D5-A172BE5D5EDF}" type="datetimeFigureOut">
               <a:rPr lang="en-US" smtClean="0"/>
-              <a:t>9/25/17</a:t>
+              <a:t>9/26/17</a:t>
             </a:fld>
             <a:endParaRPr lang="en-US"/>
           </a:p>
@@ -1610,7 +1611,7 @@
           <a:p>
             <a:fld id="{C727F7F2-7894-C348-B4D5-A172BE5D5EDF}" type="datetimeFigureOut">
               <a:rPr lang="en-US" smtClean="0"/>
-              <a:t>9/25/17</a:t>
+              <a:t>9/26/17</a:t>
             </a:fld>
             <a:endParaRPr lang="en-US"/>
           </a:p>
@@ -1728,7 +1729,7 @@
           <a:p>
             <a:fld id="{C727F7F2-7894-C348-B4D5-A172BE5D5EDF}" type="datetimeFigureOut">
               <a:rPr lang="en-US" smtClean="0"/>
-              <a:t>9/25/17</a:t>
+              <a:t>9/26/17</a:t>
             </a:fld>
             <a:endParaRPr lang="en-US"/>
           </a:p>
@@ -1823,7 +1824,7 @@
           <a:p>
             <a:fld id="{C727F7F2-7894-C348-B4D5-A172BE5D5EDF}" type="datetimeFigureOut">
               <a:rPr lang="en-US" smtClean="0"/>
-              <a:t>9/25/17</a:t>
+              <a:t>9/26/17</a:t>
             </a:fld>
             <a:endParaRPr lang="en-US"/>
           </a:p>
@@ -2100,7 +2101,7 @@
           <a:p>
             <a:fld id="{C727F7F2-7894-C348-B4D5-A172BE5D5EDF}" type="datetimeFigureOut">
               <a:rPr lang="en-US" smtClean="0"/>
-              <a:t>9/25/17</a:t>
+              <a:t>9/26/17</a:t>
             </a:fld>
             <a:endParaRPr lang="en-US"/>
           </a:p>
@@ -2353,7 +2354,7 @@
           <a:p>
             <a:fld id="{C727F7F2-7894-C348-B4D5-A172BE5D5EDF}" type="datetimeFigureOut">
               <a:rPr lang="en-US" smtClean="0"/>
-              <a:t>9/25/17</a:t>
+              <a:t>9/26/17</a:t>
             </a:fld>
             <a:endParaRPr lang="en-US"/>
           </a:p>
@@ -2566,7 +2567,7 @@
           <a:p>
             <a:fld id="{C727F7F2-7894-C348-B4D5-A172BE5D5EDF}" type="datetimeFigureOut">
               <a:rPr lang="en-US" smtClean="0"/>
-              <a:t>9/25/17</a:t>
+              <a:t>9/26/17</a:t>
             </a:fld>
             <a:endParaRPr lang="en-US"/>
           </a:p>
@@ -4188,6 +4189,880 @@
 </p:sld>
 </file>
 
+<file path=ppt/slides/slide4.xml><?xml version="1.0" encoding="utf-8"?>
+<p:sld xmlns:a="http://schemas.openxmlformats.org/drawingml/2006/main" xmlns:r="http://schemas.openxmlformats.org/officeDocument/2006/relationships" xmlns:p="http://schemas.openxmlformats.org/presentationml/2006/main">
+  <p:cSld>
+    <p:spTree>
+      <p:nvGrpSpPr>
+        <p:cNvPr id="1" name=""/>
+        <p:cNvGrpSpPr/>
+        <p:nvPr/>
+      </p:nvGrpSpPr>
+      <p:grpSpPr>
+        <a:xfrm>
+          <a:off x="0" y="0"/>
+          <a:ext cx="0" cy="0"/>
+          <a:chOff x="0" y="0"/>
+          <a:chExt cx="0" cy="0"/>
+        </a:xfrm>
+      </p:grpSpPr>
+      <p:grpSp>
+        <p:nvGrpSpPr>
+          <p:cNvPr id="35" name="Group 34"/>
+          <p:cNvGrpSpPr/>
+          <p:nvPr/>
+        </p:nvGrpSpPr>
+        <p:grpSpPr>
+          <a:xfrm>
+            <a:off x="2607734" y="1286933"/>
+            <a:ext cx="6374059" cy="5012694"/>
+            <a:chOff x="2607734" y="1286933"/>
+            <a:chExt cx="6374059" cy="5012694"/>
+          </a:xfrm>
+          <a:solidFill>
+            <a:schemeClr val="tx1"/>
+          </a:solidFill>
+        </p:grpSpPr>
+        <p:grpSp>
+          <p:nvGrpSpPr>
+            <p:cNvPr id="8" name="Group 7"/>
+            <p:cNvGrpSpPr/>
+            <p:nvPr/>
+          </p:nvGrpSpPr>
+          <p:grpSpPr>
+            <a:xfrm flipH="1">
+              <a:off x="2607734" y="1286933"/>
+              <a:ext cx="6374059" cy="5012694"/>
+              <a:chOff x="2607734" y="1286933"/>
+              <a:chExt cx="6374059" cy="5012694"/>
+            </a:xfrm>
+            <a:grpFill/>
+          </p:grpSpPr>
+          <p:sp>
+            <p:nvSpPr>
+              <p:cNvPr id="4" name="Freeform 3"/>
+              <p:cNvSpPr/>
+              <p:nvPr/>
+            </p:nvSpPr>
+            <p:spPr>
+              <a:xfrm>
+                <a:off x="2607734" y="1286933"/>
+                <a:ext cx="6374059" cy="5012694"/>
+              </a:xfrm>
+              <a:custGeom>
+                <a:avLst/>
+                <a:gdLst>
+                  <a:gd name="connsiteX0" fmla="*/ 0 w 6374059"/>
+                  <a:gd name="connsiteY0" fmla="*/ 0 h 5012694"/>
+                  <a:gd name="connsiteX1" fmla="*/ 143934 w 6374059"/>
+                  <a:gd name="connsiteY1" fmla="*/ 719667 h 5012694"/>
+                  <a:gd name="connsiteX2" fmla="*/ 372534 w 6374059"/>
+                  <a:gd name="connsiteY2" fmla="*/ 2294467 h 5012694"/>
+                  <a:gd name="connsiteX3" fmla="*/ 262467 w 6374059"/>
+                  <a:gd name="connsiteY3" fmla="*/ 3183467 h 5012694"/>
+                  <a:gd name="connsiteX4" fmla="*/ 50800 w 6374059"/>
+                  <a:gd name="connsiteY4" fmla="*/ 3869267 h 5012694"/>
+                  <a:gd name="connsiteX5" fmla="*/ 169334 w 6374059"/>
+                  <a:gd name="connsiteY5" fmla="*/ 4631267 h 5012694"/>
+                  <a:gd name="connsiteX6" fmla="*/ 533400 w 6374059"/>
+                  <a:gd name="connsiteY6" fmla="*/ 4902200 h 5012694"/>
+                  <a:gd name="connsiteX7" fmla="*/ 1456267 w 6374059"/>
+                  <a:gd name="connsiteY7" fmla="*/ 4859867 h 5012694"/>
+                  <a:gd name="connsiteX8" fmla="*/ 2506134 w 6374059"/>
+                  <a:gd name="connsiteY8" fmla="*/ 4758267 h 5012694"/>
+                  <a:gd name="connsiteX9" fmla="*/ 3352800 w 6374059"/>
+                  <a:gd name="connsiteY9" fmla="*/ 4826000 h 5012694"/>
+                  <a:gd name="connsiteX10" fmla="*/ 4563534 w 6374059"/>
+                  <a:gd name="connsiteY10" fmla="*/ 4978400 h 5012694"/>
+                  <a:gd name="connsiteX11" fmla="*/ 5291667 w 6374059"/>
+                  <a:gd name="connsiteY11" fmla="*/ 4927600 h 5012694"/>
+                  <a:gd name="connsiteX12" fmla="*/ 5706534 w 6374059"/>
+                  <a:gd name="connsiteY12" fmla="*/ 5012267 h 5012694"/>
+                  <a:gd name="connsiteX13" fmla="*/ 6299200 w 6374059"/>
+                  <a:gd name="connsiteY13" fmla="*/ 4944534 h 5012694"/>
+                  <a:gd name="connsiteX14" fmla="*/ 6350000 w 6374059"/>
+                  <a:gd name="connsiteY14" fmla="*/ 4648200 h 5012694"/>
+                  <a:gd name="connsiteX15" fmla="*/ 6155267 w 6374059"/>
+                  <a:gd name="connsiteY15" fmla="*/ 4470400 h 5012694"/>
+                  <a:gd name="connsiteX16" fmla="*/ 5689600 w 6374059"/>
+                  <a:gd name="connsiteY16" fmla="*/ 4368800 h 5012694"/>
+                  <a:gd name="connsiteX17" fmla="*/ 5147734 w 6374059"/>
+                  <a:gd name="connsiteY17" fmla="*/ 4123267 h 5012694"/>
+                  <a:gd name="connsiteX18" fmla="*/ 4893734 w 6374059"/>
+                  <a:gd name="connsiteY18" fmla="*/ 3937000 h 5012694"/>
+                  <a:gd name="connsiteX19" fmla="*/ 4097867 w 6374059"/>
+                  <a:gd name="connsiteY19" fmla="*/ 3530600 h 5012694"/>
+                  <a:gd name="connsiteX20" fmla="*/ 3124200 w 6374059"/>
+                  <a:gd name="connsiteY20" fmla="*/ 3064934 h 5012694"/>
+                  <a:gd name="connsiteX21" fmla="*/ 2633134 w 6374059"/>
+                  <a:gd name="connsiteY21" fmla="*/ 2895600 h 5012694"/>
+                  <a:gd name="connsiteX22" fmla="*/ 2370667 w 6374059"/>
+                  <a:gd name="connsiteY22" fmla="*/ 2650067 h 5012694"/>
+                  <a:gd name="connsiteX23" fmla="*/ 2260600 w 6374059"/>
+                  <a:gd name="connsiteY23" fmla="*/ 2091267 h 5012694"/>
+                  <a:gd name="connsiteX24" fmla="*/ 2336800 w 6374059"/>
+                  <a:gd name="connsiteY24" fmla="*/ 931334 h 5012694"/>
+                  <a:gd name="connsiteX25" fmla="*/ 2497667 w 6374059"/>
+                  <a:gd name="connsiteY25" fmla="*/ 25400 h 5012694"/>
+                </a:gdLst>
+                <a:ahLst/>
+                <a:cxnLst>
+                  <a:cxn ang="0">
+                    <a:pos x="connsiteX0" y="connsiteY0"/>
+                  </a:cxn>
+                  <a:cxn ang="0">
+                    <a:pos x="connsiteX1" y="connsiteY1"/>
+                  </a:cxn>
+                  <a:cxn ang="0">
+                    <a:pos x="connsiteX2" y="connsiteY2"/>
+                  </a:cxn>
+                  <a:cxn ang="0">
+                    <a:pos x="connsiteX3" y="connsiteY3"/>
+                  </a:cxn>
+                  <a:cxn ang="0">
+                    <a:pos x="connsiteX4" y="connsiteY4"/>
+                  </a:cxn>
+                  <a:cxn ang="0">
+                    <a:pos x="connsiteX5" y="connsiteY5"/>
+                  </a:cxn>
+                  <a:cxn ang="0">
+                    <a:pos x="connsiteX6" y="connsiteY6"/>
+                  </a:cxn>
+                  <a:cxn ang="0">
+                    <a:pos x="connsiteX7" y="connsiteY7"/>
+                  </a:cxn>
+                  <a:cxn ang="0">
+                    <a:pos x="connsiteX8" y="connsiteY8"/>
+                  </a:cxn>
+                  <a:cxn ang="0">
+                    <a:pos x="connsiteX9" y="connsiteY9"/>
+                  </a:cxn>
+                  <a:cxn ang="0">
+                    <a:pos x="connsiteX10" y="connsiteY10"/>
+                  </a:cxn>
+                  <a:cxn ang="0">
+                    <a:pos x="connsiteX11" y="connsiteY11"/>
+                  </a:cxn>
+                  <a:cxn ang="0">
+                    <a:pos x="connsiteX12" y="connsiteY12"/>
+                  </a:cxn>
+                  <a:cxn ang="0">
+                    <a:pos x="connsiteX13" y="connsiteY13"/>
+                  </a:cxn>
+                  <a:cxn ang="0">
+                    <a:pos x="connsiteX14" y="connsiteY14"/>
+                  </a:cxn>
+                  <a:cxn ang="0">
+                    <a:pos x="connsiteX15" y="connsiteY15"/>
+                  </a:cxn>
+                  <a:cxn ang="0">
+                    <a:pos x="connsiteX16" y="connsiteY16"/>
+                  </a:cxn>
+                  <a:cxn ang="0">
+                    <a:pos x="connsiteX17" y="connsiteY17"/>
+                  </a:cxn>
+                  <a:cxn ang="0">
+                    <a:pos x="connsiteX18" y="connsiteY18"/>
+                  </a:cxn>
+                  <a:cxn ang="0">
+                    <a:pos x="connsiteX19" y="connsiteY19"/>
+                  </a:cxn>
+                  <a:cxn ang="0">
+                    <a:pos x="connsiteX20" y="connsiteY20"/>
+                  </a:cxn>
+                  <a:cxn ang="0">
+                    <a:pos x="connsiteX21" y="connsiteY21"/>
+                  </a:cxn>
+                  <a:cxn ang="0">
+                    <a:pos x="connsiteX22" y="connsiteY22"/>
+                  </a:cxn>
+                  <a:cxn ang="0">
+                    <a:pos x="connsiteX23" y="connsiteY23"/>
+                  </a:cxn>
+                  <a:cxn ang="0">
+                    <a:pos x="connsiteX24" y="connsiteY24"/>
+                  </a:cxn>
+                  <a:cxn ang="0">
+                    <a:pos x="connsiteX25" y="connsiteY25"/>
+                  </a:cxn>
+                </a:cxnLst>
+                <a:rect l="l" t="t" r="r" b="b"/>
+                <a:pathLst>
+                  <a:path w="6374059" h="5012694">
+                    <a:moveTo>
+                      <a:pt x="0" y="0"/>
+                    </a:moveTo>
+                    <a:cubicBezTo>
+                      <a:pt x="40922" y="168628"/>
+                      <a:pt x="81845" y="337256"/>
+                      <a:pt x="143934" y="719667"/>
+                    </a:cubicBezTo>
+                    <a:cubicBezTo>
+                      <a:pt x="206023" y="1102078"/>
+                      <a:pt x="352779" y="1883834"/>
+                      <a:pt x="372534" y="2294467"/>
+                    </a:cubicBezTo>
+                    <a:cubicBezTo>
+                      <a:pt x="392289" y="2705100"/>
+                      <a:pt x="316089" y="2921001"/>
+                      <a:pt x="262467" y="3183467"/>
+                    </a:cubicBezTo>
+                    <a:cubicBezTo>
+                      <a:pt x="208845" y="3445933"/>
+                      <a:pt x="66322" y="3627967"/>
+                      <a:pt x="50800" y="3869267"/>
+                    </a:cubicBezTo>
+                    <a:cubicBezTo>
+                      <a:pt x="35278" y="4110567"/>
+                      <a:pt x="88901" y="4459111"/>
+                      <a:pt x="169334" y="4631267"/>
+                    </a:cubicBezTo>
+                    <a:cubicBezTo>
+                      <a:pt x="249767" y="4803423"/>
+                      <a:pt x="318911" y="4864100"/>
+                      <a:pt x="533400" y="4902200"/>
+                    </a:cubicBezTo>
+                    <a:cubicBezTo>
+                      <a:pt x="747889" y="4940300"/>
+                      <a:pt x="1127478" y="4883856"/>
+                      <a:pt x="1456267" y="4859867"/>
+                    </a:cubicBezTo>
+                    <a:cubicBezTo>
+                      <a:pt x="1785056" y="4835878"/>
+                      <a:pt x="2190045" y="4763911"/>
+                      <a:pt x="2506134" y="4758267"/>
+                    </a:cubicBezTo>
+                    <a:cubicBezTo>
+                      <a:pt x="2822223" y="4752623"/>
+                      <a:pt x="3009900" y="4789311"/>
+                      <a:pt x="3352800" y="4826000"/>
+                    </a:cubicBezTo>
+                    <a:cubicBezTo>
+                      <a:pt x="3695700" y="4862689"/>
+                      <a:pt x="4240389" y="4961467"/>
+                      <a:pt x="4563534" y="4978400"/>
+                    </a:cubicBezTo>
+                    <a:cubicBezTo>
+                      <a:pt x="4886679" y="4995333"/>
+                      <a:pt x="5101167" y="4921956"/>
+                      <a:pt x="5291667" y="4927600"/>
+                    </a:cubicBezTo>
+                    <a:cubicBezTo>
+                      <a:pt x="5482167" y="4933244"/>
+                      <a:pt x="5538612" y="5009445"/>
+                      <a:pt x="5706534" y="5012267"/>
+                    </a:cubicBezTo>
+                    <a:cubicBezTo>
+                      <a:pt x="5874456" y="5015089"/>
+                      <a:pt x="6191956" y="5005212"/>
+                      <a:pt x="6299200" y="4944534"/>
+                    </a:cubicBezTo>
+                    <a:cubicBezTo>
+                      <a:pt x="6406444" y="4883856"/>
+                      <a:pt x="6373989" y="4727222"/>
+                      <a:pt x="6350000" y="4648200"/>
+                    </a:cubicBezTo>
+                    <a:cubicBezTo>
+                      <a:pt x="6326011" y="4569178"/>
+                      <a:pt x="6265334" y="4516967"/>
+                      <a:pt x="6155267" y="4470400"/>
+                    </a:cubicBezTo>
+                    <a:cubicBezTo>
+                      <a:pt x="6045200" y="4423833"/>
+                      <a:pt x="5857522" y="4426656"/>
+                      <a:pt x="5689600" y="4368800"/>
+                    </a:cubicBezTo>
+                    <a:cubicBezTo>
+                      <a:pt x="5521678" y="4310944"/>
+                      <a:pt x="5280378" y="4195234"/>
+                      <a:pt x="5147734" y="4123267"/>
+                    </a:cubicBezTo>
+                    <a:cubicBezTo>
+                      <a:pt x="5015090" y="4051300"/>
+                      <a:pt x="5068712" y="4035778"/>
+                      <a:pt x="4893734" y="3937000"/>
+                    </a:cubicBezTo>
+                    <a:cubicBezTo>
+                      <a:pt x="4718756" y="3838222"/>
+                      <a:pt x="4392789" y="3675944"/>
+                      <a:pt x="4097867" y="3530600"/>
+                    </a:cubicBezTo>
+                    <a:cubicBezTo>
+                      <a:pt x="3802945" y="3385256"/>
+                      <a:pt x="3368322" y="3170767"/>
+                      <a:pt x="3124200" y="3064934"/>
+                    </a:cubicBezTo>
+                    <a:cubicBezTo>
+                      <a:pt x="2880078" y="2959101"/>
+                      <a:pt x="2758723" y="2964744"/>
+                      <a:pt x="2633134" y="2895600"/>
+                    </a:cubicBezTo>
+                    <a:cubicBezTo>
+                      <a:pt x="2507545" y="2826456"/>
+                      <a:pt x="2432756" y="2784122"/>
+                      <a:pt x="2370667" y="2650067"/>
+                    </a:cubicBezTo>
+                    <a:cubicBezTo>
+                      <a:pt x="2308578" y="2516012"/>
+                      <a:pt x="2266244" y="2377722"/>
+                      <a:pt x="2260600" y="2091267"/>
+                    </a:cubicBezTo>
+                    <a:cubicBezTo>
+                      <a:pt x="2254956" y="1804812"/>
+                      <a:pt x="2297289" y="1275645"/>
+                      <a:pt x="2336800" y="931334"/>
+                    </a:cubicBezTo>
+                    <a:cubicBezTo>
+                      <a:pt x="2376311" y="587023"/>
+                      <a:pt x="2497667" y="25400"/>
+                      <a:pt x="2497667" y="25400"/>
+                    </a:cubicBezTo>
+                  </a:path>
+                </a:pathLst>
+              </a:custGeom>
+              <a:noFill/>
+              <a:ln>
+                <a:solidFill>
+                  <a:schemeClr val="tx1"/>
+                </a:solidFill>
+              </a:ln>
+            </p:spPr>
+            <p:style>
+              <a:lnRef idx="2">
+                <a:schemeClr val="accent1">
+                  <a:shade val="50000"/>
+                </a:schemeClr>
+              </a:lnRef>
+              <a:fillRef idx="1">
+                <a:schemeClr val="accent1"/>
+              </a:fillRef>
+              <a:effectRef idx="0">
+                <a:schemeClr val="accent1"/>
+              </a:effectRef>
+              <a:fontRef idx="minor">
+                <a:schemeClr val="lt1"/>
+              </a:fontRef>
+            </p:style>
+            <p:txBody>
+              <a:bodyPr rtlCol="0" anchor="ctr"/>
+              <a:lstStyle/>
+              <a:p>
+                <a:pPr algn="ctr"/>
+                <a:endParaRPr lang="en-US"/>
+              </a:p>
+            </p:txBody>
+          </p:sp>
+          <p:cxnSp>
+            <p:nvCxnSpPr>
+              <p:cNvPr id="6" name="Straight Connector 5"/>
+              <p:cNvCxnSpPr>
+                <a:endCxn id="4" idx="25"/>
+              </p:cNvCxnSpPr>
+              <p:nvPr/>
+            </p:nvCxnSpPr>
+            <p:spPr>
+              <a:xfrm>
+                <a:off x="2607734" y="1286933"/>
+                <a:ext cx="2497667" cy="25400"/>
+              </a:xfrm>
+              <a:prstGeom prst="line">
+                <a:avLst/>
+              </a:prstGeom>
+              <a:grpFill/>
+              <a:ln>
+                <a:solidFill>
+                  <a:schemeClr val="tx1"/>
+                </a:solidFill>
+              </a:ln>
+            </p:spPr>
+            <p:style>
+              <a:lnRef idx="1">
+                <a:schemeClr val="accent1"/>
+              </a:lnRef>
+              <a:fillRef idx="0">
+                <a:schemeClr val="accent1"/>
+              </a:fillRef>
+              <a:effectRef idx="0">
+                <a:schemeClr val="accent1"/>
+              </a:effectRef>
+              <a:fontRef idx="minor">
+                <a:schemeClr val="tx1"/>
+              </a:fontRef>
+            </p:style>
+          </p:cxnSp>
+        </p:grpSp>
+        <p:sp>
+          <p:nvSpPr>
+            <p:cNvPr id="13" name="Oval 12"/>
+            <p:cNvSpPr/>
+            <p:nvPr/>
+          </p:nvSpPr>
+          <p:spPr>
+            <a:xfrm>
+              <a:off x="3843867" y="5689600"/>
+              <a:ext cx="254000" cy="254000"/>
+            </a:xfrm>
+            <a:prstGeom prst="ellipse">
+              <a:avLst/>
+            </a:prstGeom>
+            <a:grpFill/>
+            <a:ln>
+              <a:solidFill>
+                <a:schemeClr val="tx1"/>
+              </a:solidFill>
+            </a:ln>
+          </p:spPr>
+          <p:style>
+            <a:lnRef idx="2">
+              <a:schemeClr val="accent1">
+                <a:shade val="50000"/>
+              </a:schemeClr>
+            </a:lnRef>
+            <a:fillRef idx="1">
+              <a:schemeClr val="accent1"/>
+            </a:fillRef>
+            <a:effectRef idx="0">
+              <a:schemeClr val="accent1"/>
+            </a:effectRef>
+            <a:fontRef idx="minor">
+              <a:schemeClr val="lt1"/>
+            </a:fontRef>
+          </p:style>
+          <p:txBody>
+            <a:bodyPr rtlCol="0" anchor="ctr"/>
+            <a:lstStyle/>
+            <a:p>
+              <a:pPr algn="ctr"/>
+              <a:endParaRPr lang="en-US"/>
+            </a:p>
+          </p:txBody>
+        </p:sp>
+        <p:sp>
+          <p:nvSpPr>
+            <p:cNvPr id="14" name="Oval 13"/>
+            <p:cNvSpPr/>
+            <p:nvPr/>
+          </p:nvSpPr>
+          <p:spPr>
+            <a:xfrm>
+              <a:off x="2760133" y="5909733"/>
+              <a:ext cx="254000" cy="254000"/>
+            </a:xfrm>
+            <a:prstGeom prst="ellipse">
+              <a:avLst/>
+            </a:prstGeom>
+            <a:grpFill/>
+            <a:ln>
+              <a:solidFill>
+                <a:schemeClr val="tx1"/>
+              </a:solidFill>
+            </a:ln>
+          </p:spPr>
+          <p:style>
+            <a:lnRef idx="2">
+              <a:schemeClr val="accent1">
+                <a:shade val="50000"/>
+              </a:schemeClr>
+            </a:lnRef>
+            <a:fillRef idx="1">
+              <a:schemeClr val="accent1"/>
+            </a:fillRef>
+            <a:effectRef idx="0">
+              <a:schemeClr val="accent1"/>
+            </a:effectRef>
+            <a:fontRef idx="minor">
+              <a:schemeClr val="lt1"/>
+            </a:fontRef>
+          </p:style>
+          <p:txBody>
+            <a:bodyPr rtlCol="0" anchor="ctr"/>
+            <a:lstStyle/>
+            <a:p>
+              <a:pPr algn="ctr"/>
+              <a:endParaRPr lang="en-US"/>
+            </a:p>
+          </p:txBody>
+        </p:sp>
+        <p:sp>
+          <p:nvSpPr>
+            <p:cNvPr id="15" name="Oval 14"/>
+            <p:cNvSpPr/>
+            <p:nvPr/>
+          </p:nvSpPr>
+          <p:spPr>
+            <a:xfrm>
+              <a:off x="8373532" y="5765800"/>
+              <a:ext cx="254000" cy="254000"/>
+            </a:xfrm>
+            <a:prstGeom prst="ellipse">
+              <a:avLst/>
+            </a:prstGeom>
+            <a:grpFill/>
+            <a:ln>
+              <a:solidFill>
+                <a:schemeClr val="tx1"/>
+              </a:solidFill>
+            </a:ln>
+          </p:spPr>
+          <p:style>
+            <a:lnRef idx="2">
+              <a:schemeClr val="accent1">
+                <a:shade val="50000"/>
+              </a:schemeClr>
+            </a:lnRef>
+            <a:fillRef idx="1">
+              <a:schemeClr val="accent1"/>
+            </a:fillRef>
+            <a:effectRef idx="0">
+              <a:schemeClr val="accent1"/>
+            </a:effectRef>
+            <a:fontRef idx="minor">
+              <a:schemeClr val="lt1"/>
+            </a:fontRef>
+          </p:style>
+          <p:txBody>
+            <a:bodyPr rtlCol="0" anchor="ctr"/>
+            <a:lstStyle/>
+            <a:p>
+              <a:pPr algn="ctr"/>
+              <a:endParaRPr lang="en-US"/>
+            </a:p>
+          </p:txBody>
+        </p:sp>
+        <p:sp>
+          <p:nvSpPr>
+            <p:cNvPr id="16" name="Oval 15"/>
+            <p:cNvSpPr/>
+            <p:nvPr/>
+          </p:nvSpPr>
+          <p:spPr>
+            <a:xfrm>
+              <a:off x="6357126" y="5266267"/>
+              <a:ext cx="254000" cy="254000"/>
+            </a:xfrm>
+            <a:prstGeom prst="ellipse">
+              <a:avLst/>
+            </a:prstGeom>
+            <a:grpFill/>
+            <a:ln>
+              <a:solidFill>
+                <a:schemeClr val="tx1"/>
+              </a:solidFill>
+            </a:ln>
+          </p:spPr>
+          <p:style>
+            <a:lnRef idx="2">
+              <a:schemeClr val="accent1">
+                <a:shade val="50000"/>
+              </a:schemeClr>
+            </a:lnRef>
+            <a:fillRef idx="1">
+              <a:schemeClr val="accent1"/>
+            </a:fillRef>
+            <a:effectRef idx="0">
+              <a:schemeClr val="accent1"/>
+            </a:effectRef>
+            <a:fontRef idx="minor">
+              <a:schemeClr val="lt1"/>
+            </a:fontRef>
+          </p:style>
+          <p:txBody>
+            <a:bodyPr rtlCol="0" anchor="ctr"/>
+            <a:lstStyle/>
+            <a:p>
+              <a:pPr algn="ctr"/>
+              <a:endParaRPr lang="en-US"/>
+            </a:p>
+          </p:txBody>
+        </p:sp>
+        <p:sp>
+          <p:nvSpPr>
+            <p:cNvPr id="17" name="Oval 16"/>
+            <p:cNvSpPr/>
+            <p:nvPr/>
+          </p:nvSpPr>
+          <p:spPr>
+            <a:xfrm>
+              <a:off x="7605959" y="4445000"/>
+              <a:ext cx="254000" cy="254000"/>
+            </a:xfrm>
+            <a:prstGeom prst="ellipse">
+              <a:avLst/>
+            </a:prstGeom>
+            <a:grpFill/>
+            <a:ln>
+              <a:solidFill>
+                <a:schemeClr val="tx1"/>
+              </a:solidFill>
+            </a:ln>
+          </p:spPr>
+          <p:style>
+            <a:lnRef idx="2">
+              <a:schemeClr val="accent1">
+                <a:shade val="50000"/>
+              </a:schemeClr>
+            </a:lnRef>
+            <a:fillRef idx="1">
+              <a:schemeClr val="accent1"/>
+            </a:fillRef>
+            <a:effectRef idx="0">
+              <a:schemeClr val="accent1"/>
+            </a:effectRef>
+            <a:fontRef idx="minor">
+              <a:schemeClr val="lt1"/>
+            </a:fontRef>
+          </p:style>
+          <p:txBody>
+            <a:bodyPr rtlCol="0" anchor="ctr"/>
+            <a:lstStyle/>
+            <a:p>
+              <a:pPr algn="ctr"/>
+              <a:endParaRPr lang="en-US"/>
+            </a:p>
+          </p:txBody>
+        </p:sp>
+        <p:sp>
+          <p:nvSpPr>
+            <p:cNvPr id="18" name="Oval 17"/>
+            <p:cNvSpPr/>
+            <p:nvPr/>
+          </p:nvSpPr>
+          <p:spPr>
+            <a:xfrm>
+              <a:off x="7605959" y="1312333"/>
+              <a:ext cx="254000" cy="254000"/>
+            </a:xfrm>
+            <a:prstGeom prst="ellipse">
+              <a:avLst/>
+            </a:prstGeom>
+            <a:grpFill/>
+            <a:ln>
+              <a:solidFill>
+                <a:schemeClr val="tx1"/>
+              </a:solidFill>
+            </a:ln>
+          </p:spPr>
+          <p:style>
+            <a:lnRef idx="2">
+              <a:schemeClr val="accent1">
+                <a:shade val="50000"/>
+              </a:schemeClr>
+            </a:lnRef>
+            <a:fillRef idx="1">
+              <a:schemeClr val="accent1"/>
+            </a:fillRef>
+            <a:effectRef idx="0">
+              <a:schemeClr val="accent1"/>
+            </a:effectRef>
+            <a:fontRef idx="minor">
+              <a:schemeClr val="lt1"/>
+            </a:fontRef>
+          </p:style>
+          <p:txBody>
+            <a:bodyPr rtlCol="0" anchor="ctr"/>
+            <a:lstStyle/>
+            <a:p>
+              <a:pPr algn="ctr"/>
+              <a:endParaRPr lang="en-US"/>
+            </a:p>
+          </p:txBody>
+        </p:sp>
+        <p:cxnSp>
+          <p:nvCxnSpPr>
+            <p:cNvPr id="20" name="Straight Connector 19"/>
+            <p:cNvCxnSpPr/>
+            <p:nvPr/>
+          </p:nvCxnSpPr>
+          <p:spPr>
+            <a:xfrm flipV="1">
+              <a:off x="2887133" y="5816601"/>
+              <a:ext cx="1083734" cy="220132"/>
+            </a:xfrm>
+            <a:prstGeom prst="line">
+              <a:avLst/>
+            </a:prstGeom>
+            <a:grpFill/>
+            <a:ln w="57150">
+              <a:solidFill>
+                <a:schemeClr val="tx1"/>
+              </a:solidFill>
+            </a:ln>
+          </p:spPr>
+          <p:style>
+            <a:lnRef idx="1">
+              <a:schemeClr val="accent1"/>
+            </a:lnRef>
+            <a:fillRef idx="0">
+              <a:schemeClr val="accent1"/>
+            </a:fillRef>
+            <a:effectRef idx="0">
+              <a:schemeClr val="accent1"/>
+            </a:effectRef>
+            <a:fontRef idx="minor">
+              <a:schemeClr val="tx1"/>
+            </a:fontRef>
+          </p:style>
+        </p:cxnSp>
+        <p:cxnSp>
+          <p:nvCxnSpPr>
+            <p:cNvPr id="22" name="Straight Connector 21"/>
+            <p:cNvCxnSpPr>
+              <a:endCxn id="16" idx="2"/>
+            </p:cNvCxnSpPr>
+            <p:nvPr/>
+          </p:nvCxnSpPr>
+          <p:spPr>
+            <a:xfrm flipV="1">
+              <a:off x="3970867" y="5393267"/>
+              <a:ext cx="2386259" cy="423333"/>
+            </a:xfrm>
+            <a:prstGeom prst="line">
+              <a:avLst/>
+            </a:prstGeom>
+            <a:grpFill/>
+            <a:ln w="57150">
+              <a:solidFill>
+                <a:schemeClr val="tx1"/>
+              </a:solidFill>
+            </a:ln>
+          </p:spPr>
+          <p:style>
+            <a:lnRef idx="1">
+              <a:schemeClr val="accent1"/>
+            </a:lnRef>
+            <a:fillRef idx="0">
+              <a:schemeClr val="accent1"/>
+            </a:fillRef>
+            <a:effectRef idx="0">
+              <a:schemeClr val="accent1"/>
+            </a:effectRef>
+            <a:fontRef idx="minor">
+              <a:schemeClr val="tx1"/>
+            </a:fontRef>
+          </p:style>
+        </p:cxnSp>
+        <p:cxnSp>
+          <p:nvCxnSpPr>
+            <p:cNvPr id="27" name="Straight Connector 26"/>
+            <p:cNvCxnSpPr/>
+            <p:nvPr/>
+          </p:nvCxnSpPr>
+          <p:spPr>
+            <a:xfrm flipV="1">
+              <a:off x="6484126" y="4572000"/>
+              <a:ext cx="1248833" cy="820841"/>
+            </a:xfrm>
+            <a:prstGeom prst="line">
+              <a:avLst/>
+            </a:prstGeom>
+            <a:grpFill/>
+            <a:ln w="57150">
+              <a:solidFill>
+                <a:schemeClr val="tx1"/>
+              </a:solidFill>
+            </a:ln>
+          </p:spPr>
+          <p:style>
+            <a:lnRef idx="1">
+              <a:schemeClr val="accent1"/>
+            </a:lnRef>
+            <a:fillRef idx="0">
+              <a:schemeClr val="accent1"/>
+            </a:fillRef>
+            <a:effectRef idx="0">
+              <a:schemeClr val="accent1"/>
+            </a:effectRef>
+            <a:fontRef idx="minor">
+              <a:schemeClr val="tx1"/>
+            </a:fontRef>
+          </p:style>
+        </p:cxnSp>
+        <p:cxnSp>
+          <p:nvCxnSpPr>
+            <p:cNvPr id="28" name="Straight Connector 27"/>
+            <p:cNvCxnSpPr/>
+            <p:nvPr/>
+          </p:nvCxnSpPr>
+          <p:spPr>
+            <a:xfrm>
+              <a:off x="7732959" y="4572000"/>
+              <a:ext cx="767573" cy="1329481"/>
+            </a:xfrm>
+            <a:prstGeom prst="line">
+              <a:avLst/>
+            </a:prstGeom>
+            <a:grpFill/>
+            <a:ln w="57150">
+              <a:solidFill>
+                <a:schemeClr val="tx1"/>
+              </a:solidFill>
+            </a:ln>
+          </p:spPr>
+          <p:style>
+            <a:lnRef idx="1">
+              <a:schemeClr val="accent1"/>
+            </a:lnRef>
+            <a:fillRef idx="0">
+              <a:schemeClr val="accent1"/>
+            </a:fillRef>
+            <a:effectRef idx="0">
+              <a:schemeClr val="accent1"/>
+            </a:effectRef>
+            <a:fontRef idx="minor">
+              <a:schemeClr val="tx1"/>
+            </a:fontRef>
+          </p:style>
+        </p:cxnSp>
+        <p:cxnSp>
+          <p:nvCxnSpPr>
+            <p:cNvPr id="32" name="Straight Connector 31"/>
+            <p:cNvCxnSpPr/>
+            <p:nvPr/>
+          </p:nvCxnSpPr>
+          <p:spPr>
+            <a:xfrm flipV="1">
+              <a:off x="7706219" y="1439333"/>
+              <a:ext cx="26740" cy="3144942"/>
+            </a:xfrm>
+            <a:prstGeom prst="line">
+              <a:avLst/>
+            </a:prstGeom>
+            <a:grpFill/>
+            <a:ln w="57150">
+              <a:solidFill>
+                <a:schemeClr val="tx1"/>
+              </a:solidFill>
+            </a:ln>
+          </p:spPr>
+          <p:style>
+            <a:lnRef idx="1">
+              <a:schemeClr val="accent1"/>
+            </a:lnRef>
+            <a:fillRef idx="0">
+              <a:schemeClr val="accent1"/>
+            </a:fillRef>
+            <a:effectRef idx="0">
+              <a:schemeClr val="accent1"/>
+            </a:effectRef>
+            <a:fontRef idx="minor">
+              <a:schemeClr val="tx1"/>
+            </a:fontRef>
+          </p:style>
+        </p:cxnSp>
+      </p:grpSp>
+    </p:spTree>
+    <p:extLst>
+      <p:ext uri="{BB962C8B-B14F-4D97-AF65-F5344CB8AC3E}">
+        <p14:creationId xmlns:p14="http://schemas.microsoft.com/office/powerpoint/2010/main" val="793705019"/>
+      </p:ext>
+    </p:extLst>
+  </p:cSld>
+  <p:clrMapOvr>
+    <a:masterClrMapping/>
+  </p:clrMapOvr>
+</p:sld>
+</file>
+
 <file path=ppt/theme/theme1.xml><?xml version="1.0" encoding="utf-8"?>
 <a:theme xmlns:a="http://schemas.openxmlformats.org/drawingml/2006/main" name="Office Theme">
   <a:themeElements>

</xml_diff>